<commit_message>
Fix slide sequence error on PHP and MySQL Sample code.
</commit_message>
<xml_diff>
--- a/Chapter 1/L01 - Intro to PHP.pptx
+++ b/Chapter 1/L01 - Intro to PHP.pptx
@@ -31,9 +31,9 @@
     <p:sldId id="1350" r:id="rId22"/>
     <p:sldId id="1354" r:id="rId23"/>
     <p:sldId id="1372" r:id="rId24"/>
-    <p:sldId id="1376" r:id="rId25"/>
+    <p:sldId id="1375" r:id="rId25"/>
     <p:sldId id="1374" r:id="rId26"/>
-    <p:sldId id="1375" r:id="rId27"/>
+    <p:sldId id="1376" r:id="rId27"/>
     <p:sldId id="1356" r:id="rId28"/>
     <p:sldId id="1377" r:id="rId29"/>
     <p:sldId id="1381" r:id="rId30"/>
@@ -203,9 +203,9 @@
             <p14:sldId id="1350"/>
             <p14:sldId id="1354"/>
             <p14:sldId id="1372"/>
+            <p14:sldId id="1375"/>
+            <p14:sldId id="1374"/>
             <p14:sldId id="1376"/>
-            <p14:sldId id="1374"/>
-            <p14:sldId id="1375"/>
             <p14:sldId id="1356"/>
             <p14:sldId id="1377"/>
             <p14:sldId id="1381"/>
@@ -300,10 +300,6 @@
 </p:cmAuthorLst>
 </file>
 
-<file path=ppt/revisionInfo.xml><?xml version="1.0" encoding="utf-8"?>
-<p1510:revInfo xmlns:a="http://schemas.openxmlformats.org/drawingml/2006/main" xmlns:r="http://schemas.openxmlformats.org/officeDocument/2006/relationships" xmlns:p1510="http://schemas.microsoft.com/office/powerpoint/2015/10/main"/>
-</file>
-
 <file path=ppt/handoutMasters/handoutMaster1.xml><?xml version="1.0" encoding="utf-8"?>
 <p:handoutMaster xmlns:a="http://schemas.openxmlformats.org/drawingml/2006/main" xmlns:r="http://schemas.openxmlformats.org/officeDocument/2006/relationships" xmlns:p="http://schemas.openxmlformats.org/presentationml/2006/main">
   <p:cSld>
@@ -390,7 +386,7 @@
               <a:rPr lang="en-US" smtClean="0">
                 <a:latin typeface="Segoe UI" pitchFamily="34" charset="0"/>
               </a:rPr>
-              <a:t>2/5/2018 9:39 AM</a:t>
+              <a:t>2/18/2019 4:43 PM</a:t>
             </a:fld>
             <a:endParaRPr lang="en-US" dirty="0">
               <a:latin typeface="Segoe UI" pitchFamily="34" charset="0"/>
@@ -668,7 +664,7 @@
           <a:p>
             <a:fld id="{79C601B9-5273-467A-8E48-EC9939578C8F}" type="datetime8">
               <a:rPr lang="en-US" smtClean="0"/>
-              <a:t>2/5/2018 9:39 AM</a:t>
+              <a:t>2/18/2019 4:42 PM</a:t>
             </a:fld>
             <a:endParaRPr lang="en-US" dirty="0"/>
           </a:p>
@@ -1054,7 +1050,7 @@
           <a:p>
             <a:fld id="{79C601B9-5273-467A-8E48-EC9939578C8F}" type="datetime8">
               <a:rPr lang="en-US" smtClean="0"/>
-              <a:t>2/5/2018 9:39 AM</a:t>
+              <a:t>2/18/2019 4:42 PM</a:t>
             </a:fld>
             <a:endParaRPr lang="en-US" dirty="0"/>
           </a:p>
@@ -1189,7 +1185,7 @@
           <a:p>
             <a:fld id="{9AB2E0C1-2107-4DA2-BB49-BDF54AED96B7}" type="datetime8">
               <a:rPr lang="en-US" smtClean="0"/>
-              <a:t>2/5/2018 9:39 AM</a:t>
+              <a:t>2/18/2019 4:42 PM</a:t>
             </a:fld>
             <a:endParaRPr lang="en-US" dirty="0"/>
           </a:p>
@@ -1378,7 +1374,7 @@
           <a:p>
             <a:fld id="{9AB2E0C1-2107-4DA2-BB49-BDF54AED96B7}" type="datetime8">
               <a:rPr lang="en-US" smtClean="0"/>
-              <a:t>2/5/2018 9:39 AM</a:t>
+              <a:t>2/18/2019 4:42 PM</a:t>
             </a:fld>
             <a:endParaRPr lang="en-US" dirty="0"/>
           </a:p>
@@ -1564,7 +1560,7 @@
           <a:p>
             <a:fld id="{A48DDB6F-2ACB-4D85-85EB-7238383AEC72}" type="datetime8">
               <a:rPr lang="en-US" smtClean="0"/>
-              <a:t>2/5/2018 9:39 AM</a:t>
+              <a:t>2/18/2019 4:42 PM</a:t>
             </a:fld>
             <a:endParaRPr lang="en-US" dirty="0"/>
           </a:p>
@@ -1748,7 +1744,7 @@
           <a:p>
             <a:fld id="{9AB2E0C1-2107-4DA2-BB49-BDF54AED96B7}" type="datetime8">
               <a:rPr lang="en-US" smtClean="0"/>
-              <a:t>2/5/2018 9:39 AM</a:t>
+              <a:t>2/18/2019 4:42 PM</a:t>
             </a:fld>
             <a:endParaRPr lang="en-US" dirty="0"/>
           </a:p>
@@ -1934,7 +1930,7 @@
           <a:p>
             <a:fld id="{A48DDB6F-2ACB-4D85-85EB-7238383AEC72}" type="datetime8">
               <a:rPr lang="en-US" smtClean="0"/>
-              <a:t>2/5/2018 9:39 AM</a:t>
+              <a:t>2/18/2019 4:42 PM</a:t>
             </a:fld>
             <a:endParaRPr lang="en-US" dirty="0"/>
           </a:p>
@@ -2016,7 +2012,7 @@
     </p:spTree>
     <p:extLst>
       <p:ext uri="{BB962C8B-B14F-4D97-AF65-F5344CB8AC3E}">
-        <p14:creationId xmlns:p14="http://schemas.microsoft.com/office/powerpoint/2010/main" val="790284972"/>
+        <p14:creationId xmlns:p14="http://schemas.microsoft.com/office/powerpoint/2010/main" val="2257550897"/>
       </p:ext>
     </p:extLst>
   </p:cSld>
@@ -2118,7 +2114,7 @@
           <a:p>
             <a:fld id="{9AB2E0C1-2107-4DA2-BB49-BDF54AED96B7}" type="datetime8">
               <a:rPr lang="en-US" smtClean="0"/>
-              <a:t>2/5/2018 9:39 AM</a:t>
+              <a:t>2/18/2019 4:42 PM</a:t>
             </a:fld>
             <a:endParaRPr lang="en-US" dirty="0"/>
           </a:p>
@@ -2304,7 +2300,7 @@
           <a:p>
             <a:fld id="{A48DDB6F-2ACB-4D85-85EB-7238383AEC72}" type="datetime8">
               <a:rPr lang="en-US" smtClean="0"/>
-              <a:t>2/5/2018 9:39 AM</a:t>
+              <a:t>2/18/2019 4:42 PM</a:t>
             </a:fld>
             <a:endParaRPr lang="en-US" dirty="0"/>
           </a:p>
@@ -2386,7 +2382,7 @@
     </p:spTree>
     <p:extLst>
       <p:ext uri="{BB962C8B-B14F-4D97-AF65-F5344CB8AC3E}">
-        <p14:creationId xmlns:p14="http://schemas.microsoft.com/office/powerpoint/2010/main" val="2257550897"/>
+        <p14:creationId xmlns:p14="http://schemas.microsoft.com/office/powerpoint/2010/main" val="790284972"/>
       </p:ext>
     </p:extLst>
   </p:cSld>
@@ -2480,7 +2476,7 @@
           <a:p>
             <a:fld id="{9AB2E0C1-2107-4DA2-BB49-BDF54AED96B7}" type="datetime8">
               <a:rPr lang="en-US" smtClean="0"/>
-              <a:t>2/5/2018 9:39 AM</a:t>
+              <a:t>2/18/2019 4:42 PM</a:t>
             </a:fld>
             <a:endParaRPr lang="en-US" dirty="0"/>
           </a:p>
@@ -2715,7 +2711,7 @@
           <a:p>
             <a:fld id="{79C601B9-5273-467A-8E48-EC9939578C8F}" type="datetime8">
               <a:rPr lang="en-US" smtClean="0"/>
-              <a:t>2/5/2018 9:39 AM</a:t>
+              <a:t>2/18/2019 4:42 PM</a:t>
             </a:fld>
             <a:endParaRPr lang="en-US" dirty="0"/>
           </a:p>
@@ -2896,7 +2892,7 @@
           <a:p>
             <a:fld id="{79C601B9-5273-467A-8E48-EC9939578C8F}" type="datetime8">
               <a:rPr lang="en-US" smtClean="0"/>
-              <a:t>2/5/2018 9:39 AM</a:t>
+              <a:t>2/18/2019 4:42 PM</a:t>
             </a:fld>
             <a:endParaRPr lang="en-US" dirty="0"/>
           </a:p>
@@ -3077,7 +3073,7 @@
           <a:p>
             <a:fld id="{79C601B9-5273-467A-8E48-EC9939578C8F}" type="datetime8">
               <a:rPr lang="en-US" smtClean="0"/>
-              <a:t>2/5/2018 9:39 AM</a:t>
+              <a:t>2/18/2019 4:42 PM</a:t>
             </a:fld>
             <a:endParaRPr lang="en-US" dirty="0"/>
           </a:p>
@@ -3204,7 +3200,7 @@
           <a:p>
             <a:fld id="{9AB2E0C1-2107-4DA2-BB49-BDF54AED96B7}" type="datetime8">
               <a:rPr lang="en-US" smtClean="0"/>
-              <a:t>2/5/2018 9:39 AM</a:t>
+              <a:t>2/18/2019 4:42 PM</a:t>
             </a:fld>
             <a:endParaRPr lang="en-US" dirty="0"/>
           </a:p>
@@ -3439,7 +3435,7 @@
           <a:p>
             <a:fld id="{79C601B9-5273-467A-8E48-EC9939578C8F}" type="datetime8">
               <a:rPr lang="en-US" smtClean="0"/>
-              <a:t>2/5/2018 9:39 AM</a:t>
+              <a:t>2/18/2019 4:42 PM</a:t>
             </a:fld>
             <a:endParaRPr lang="en-US" dirty="0"/>
           </a:p>
@@ -3566,7 +3562,7 @@
           <a:p>
             <a:fld id="{9AB2E0C1-2107-4DA2-BB49-BDF54AED96B7}" type="datetime8">
               <a:rPr lang="en-US" smtClean="0"/>
-              <a:t>2/5/2018 9:39 AM</a:t>
+              <a:t>2/18/2019 4:42 PM</a:t>
             </a:fld>
             <a:endParaRPr lang="en-US" dirty="0"/>
           </a:p>
@@ -3752,7 +3748,7 @@
           <a:p>
             <a:fld id="{A48DDB6F-2ACB-4D85-85EB-7238383AEC72}" type="datetime8">
               <a:rPr lang="en-US" smtClean="0"/>
-              <a:t>2/5/2018 9:39 AM</a:t>
+              <a:t>2/18/2019 4:42 PM</a:t>
             </a:fld>
             <a:endParaRPr lang="en-US" dirty="0"/>
           </a:p>
@@ -3982,7 +3978,7 @@
           <a:p>
             <a:fld id="{79C601B9-5273-467A-8E48-EC9939578C8F}" type="datetime8">
               <a:rPr lang="en-US" smtClean="0"/>
-              <a:t>2/5/2018 9:39 AM</a:t>
+              <a:t>2/18/2019 4:42 PM</a:t>
             </a:fld>
             <a:endParaRPr lang="en-US" dirty="0"/>
           </a:p>
@@ -4114,7 +4110,7 @@
           <a:p>
             <a:fld id="{A48DDB6F-2ACB-4D85-85EB-7238383AEC72}" type="datetime8">
               <a:rPr lang="en-US" smtClean="0"/>
-              <a:t>2/5/2018 9:39 AM</a:t>
+              <a:t>2/18/2019 4:42 PM</a:t>
             </a:fld>
             <a:endParaRPr lang="en-US" dirty="0"/>
           </a:p>
@@ -4344,7 +4340,7 @@
           <a:p>
             <a:fld id="{79C601B9-5273-467A-8E48-EC9939578C8F}" type="datetime8">
               <a:rPr lang="en-US" smtClean="0"/>
-              <a:t>2/5/2018 9:39 AM</a:t>
+              <a:t>2/18/2019 4:42 PM</a:t>
             </a:fld>
             <a:endParaRPr lang="en-US" dirty="0"/>
           </a:p>
@@ -4525,7 +4521,7 @@
           <a:p>
             <a:fld id="{79C601B9-5273-467A-8E48-EC9939578C8F}" type="datetime8">
               <a:rPr lang="en-US" smtClean="0"/>
-              <a:t>2/5/2018 9:39 AM</a:t>
+              <a:t>2/18/2019 4:42 PM</a:t>
             </a:fld>
             <a:endParaRPr lang="en-US" dirty="0"/>
           </a:p>
@@ -4657,7 +4653,7 @@
           <a:p>
             <a:fld id="{A48DDB6F-2ACB-4D85-85EB-7238383AEC72}" type="datetime8">
               <a:rPr lang="en-US" smtClean="0"/>
-              <a:t>2/5/2018 9:39 AM</a:t>
+              <a:t>2/18/2019 4:42 PM</a:t>
             </a:fld>
             <a:endParaRPr lang="en-US" dirty="0"/>
           </a:p>
@@ -4887,7 +4883,7 @@
           <a:p>
             <a:fld id="{79C601B9-5273-467A-8E48-EC9939578C8F}" type="datetime8">
               <a:rPr lang="en-US" smtClean="0"/>
-              <a:t>2/5/2018 9:39 AM</a:t>
+              <a:t>2/18/2019 4:42 PM</a:t>
             </a:fld>
             <a:endParaRPr lang="en-US" dirty="0"/>
           </a:p>
@@ -5068,7 +5064,7 @@
           <a:p>
             <a:fld id="{79C601B9-5273-467A-8E48-EC9939578C8F}" type="datetime8">
               <a:rPr lang="en-US" smtClean="0"/>
-              <a:t>2/5/2018 9:39 AM</a:t>
+              <a:t>2/18/2019 4:42 PM</a:t>
             </a:fld>
             <a:endParaRPr lang="en-US" dirty="0"/>
           </a:p>
@@ -5200,7 +5196,7 @@
           <a:p>
             <a:fld id="{A48DDB6F-2ACB-4D85-85EB-7238383AEC72}" type="datetime8">
               <a:rPr lang="en-US" smtClean="0"/>
-              <a:t>2/5/2018 9:39 AM</a:t>
+              <a:t>2/18/2019 4:42 PM</a:t>
             </a:fld>
             <a:endParaRPr lang="en-US" dirty="0"/>
           </a:p>
@@ -5430,7 +5426,7 @@
           <a:p>
             <a:fld id="{79C601B9-5273-467A-8E48-EC9939578C8F}" type="datetime8">
               <a:rPr lang="en-US" smtClean="0"/>
-              <a:t>2/5/2018 9:39 AM</a:t>
+              <a:t>2/18/2019 4:42 PM</a:t>
             </a:fld>
             <a:endParaRPr lang="en-US" dirty="0"/>
           </a:p>
@@ -5562,7 +5558,7 @@
           <a:p>
             <a:fld id="{A48DDB6F-2ACB-4D85-85EB-7238383AEC72}" type="datetime8">
               <a:rPr lang="en-US" smtClean="0"/>
-              <a:t>2/5/2018 9:39 AM</a:t>
+              <a:t>2/18/2019 4:42 PM</a:t>
             </a:fld>
             <a:endParaRPr lang="en-US" dirty="0"/>
           </a:p>
@@ -5792,7 +5788,7 @@
           <a:p>
             <a:fld id="{79C601B9-5273-467A-8E48-EC9939578C8F}" type="datetime8">
               <a:rPr lang="en-US" smtClean="0"/>
-              <a:t>2/5/2018 9:39 AM</a:t>
+              <a:t>2/18/2019 4:42 PM</a:t>
             </a:fld>
             <a:endParaRPr lang="en-US" dirty="0"/>
           </a:p>
@@ -5924,7 +5920,7 @@
           <a:p>
             <a:fld id="{A48DDB6F-2ACB-4D85-85EB-7238383AEC72}" type="datetime8">
               <a:rPr lang="en-US" smtClean="0"/>
-              <a:t>2/5/2018 9:39 AM</a:t>
+              <a:t>2/18/2019 4:42 PM</a:t>
             </a:fld>
             <a:endParaRPr lang="en-US" dirty="0"/>
           </a:p>
@@ -6154,7 +6150,7 @@
           <a:p>
             <a:fld id="{79C601B9-5273-467A-8E48-EC9939578C8F}" type="datetime8">
               <a:rPr lang="en-US" smtClean="0"/>
-              <a:t>2/5/2018 9:39 AM</a:t>
+              <a:t>2/18/2019 4:42 PM</a:t>
             </a:fld>
             <a:endParaRPr lang="en-US" dirty="0"/>
           </a:p>
@@ -6335,7 +6331,7 @@
           <a:p>
             <a:fld id="{79C601B9-5273-467A-8E48-EC9939578C8F}" type="datetime8">
               <a:rPr lang="en-US" smtClean="0"/>
-              <a:t>2/5/2018 9:39 AM</a:t>
+              <a:t>2/18/2019 4:42 PM</a:t>
             </a:fld>
             <a:endParaRPr lang="en-US" dirty="0"/>
           </a:p>
@@ -6467,7 +6463,7 @@
           <a:p>
             <a:fld id="{A48DDB6F-2ACB-4D85-85EB-7238383AEC72}" type="datetime8">
               <a:rPr lang="en-US" smtClean="0"/>
-              <a:t>2/5/2018 9:39 AM</a:t>
+              <a:t>2/18/2019 4:42 PM</a:t>
             </a:fld>
             <a:endParaRPr lang="en-US" dirty="0"/>
           </a:p>
@@ -6697,7 +6693,7 @@
           <a:p>
             <a:fld id="{79C601B9-5273-467A-8E48-EC9939578C8F}" type="datetime8">
               <a:rPr lang="en-US" smtClean="0"/>
-              <a:t>2/5/2018 9:39 AM</a:t>
+              <a:t>2/18/2019 4:42 PM</a:t>
             </a:fld>
             <a:endParaRPr lang="en-US" dirty="0"/>
           </a:p>
@@ -6829,7 +6825,7 @@
           <a:p>
             <a:fld id="{A48DDB6F-2ACB-4D85-85EB-7238383AEC72}" type="datetime8">
               <a:rPr lang="en-US" smtClean="0"/>
-              <a:t>2/5/2018 9:39 AM</a:t>
+              <a:t>2/18/2019 4:42 PM</a:t>
             </a:fld>
             <a:endParaRPr lang="en-US" dirty="0"/>
           </a:p>
@@ -7005,7 +7001,7 @@
           <a:p>
             <a:fld id="{9AB2E0C1-2107-4DA2-BB49-BDF54AED96B7}" type="datetime8">
               <a:rPr lang="en-US" smtClean="0"/>
-              <a:t>2/5/2018 9:39 AM</a:t>
+              <a:t>2/18/2019 4:42 PM</a:t>
             </a:fld>
             <a:endParaRPr lang="en-US" dirty="0"/>
           </a:p>
@@ -7191,7 +7187,7 @@
           <a:p>
             <a:fld id="{A48DDB6F-2ACB-4D85-85EB-7238383AEC72}" type="datetime8">
               <a:rPr lang="en-US" smtClean="0"/>
-              <a:t>2/5/2018 9:39 AM</a:t>
+              <a:t>2/18/2019 4:42 PM</a:t>
             </a:fld>
             <a:endParaRPr lang="en-US" dirty="0"/>
           </a:p>
@@ -7421,7 +7417,7 @@
           <a:p>
             <a:fld id="{79C601B9-5273-467A-8E48-EC9939578C8F}" type="datetime8">
               <a:rPr lang="en-US" smtClean="0"/>
-              <a:t>2/5/2018 9:39 AM</a:t>
+              <a:t>2/18/2019 4:42 PM</a:t>
             </a:fld>
             <a:endParaRPr lang="en-US" dirty="0"/>
           </a:p>
@@ -7602,7 +7598,7 @@
           <a:p>
             <a:fld id="{79C601B9-5273-467A-8E48-EC9939578C8F}" type="datetime8">
               <a:rPr lang="en-US" smtClean="0"/>
-              <a:t>2/5/2018 9:39 AM</a:t>
+              <a:t>2/18/2019 4:42 PM</a:t>
             </a:fld>
             <a:endParaRPr lang="en-US" dirty="0"/>
           </a:p>
@@ -7734,7 +7730,7 @@
           <a:p>
             <a:fld id="{A48DDB6F-2ACB-4D85-85EB-7238383AEC72}" type="datetime8">
               <a:rPr lang="en-US" smtClean="0"/>
-              <a:t>2/5/2018 9:39 AM</a:t>
+              <a:t>2/18/2019 4:42 PM</a:t>
             </a:fld>
             <a:endParaRPr lang="en-US" dirty="0"/>
           </a:p>
@@ -7964,7 +7960,7 @@
           <a:p>
             <a:fld id="{79C601B9-5273-467A-8E48-EC9939578C8F}" type="datetime8">
               <a:rPr lang="en-US" smtClean="0"/>
-              <a:t>2/5/2018 9:39 AM</a:t>
+              <a:t>2/18/2019 4:42 PM</a:t>
             </a:fld>
             <a:endParaRPr lang="en-US" dirty="0"/>
           </a:p>
@@ -8091,7 +8087,7 @@
           <a:p>
             <a:fld id="{9AB2E0C1-2107-4DA2-BB49-BDF54AED96B7}" type="datetime8">
               <a:rPr lang="en-US" smtClean="0"/>
-              <a:t>2/5/2018 9:39 AM</a:t>
+              <a:t>2/18/2019 4:42 PM</a:t>
             </a:fld>
             <a:endParaRPr lang="en-US" dirty="0"/>
           </a:p>
@@ -8295,7 +8291,7 @@
                   <a:prstClr val="black"/>
                 </a:solidFill>
               </a:rPr>
-              <a:t>2/5/2018 9:39 AM</a:t>
+              <a:t>2/18/2019 4:42 PM</a:t>
             </a:fld>
             <a:endParaRPr lang="en-US" dirty="0">
               <a:solidFill>
@@ -8488,7 +8484,7 @@
           <a:p>
             <a:fld id="{9AB2E0C1-2107-4DA2-BB49-BDF54AED96B7}" type="datetime8">
               <a:rPr lang="en-US" smtClean="0"/>
-              <a:t>2/5/2018 9:39 AM</a:t>
+              <a:t>2/18/2019 4:42 PM</a:t>
             </a:fld>
             <a:endParaRPr lang="en-US" dirty="0"/>
           </a:p>
@@ -8669,7 +8665,7 @@
           <a:p>
             <a:fld id="{9AB2E0C1-2107-4DA2-BB49-BDF54AED96B7}" type="datetime8">
               <a:rPr lang="en-US" smtClean="0"/>
-              <a:t>2/5/2018 9:39 AM</a:t>
+              <a:t>2/18/2019 4:42 PM</a:t>
             </a:fld>
             <a:endParaRPr lang="en-US" dirty="0"/>
           </a:p>
@@ -8858,7 +8854,7 @@
           <a:p>
             <a:fld id="{9AB2E0C1-2107-4DA2-BB49-BDF54AED96B7}" type="datetime8">
               <a:rPr lang="en-US" smtClean="0"/>
-              <a:t>2/5/2018 9:39 AM</a:t>
+              <a:t>2/18/2019 4:42 PM</a:t>
             </a:fld>
             <a:endParaRPr lang="en-US" dirty="0"/>
           </a:p>
@@ -9039,7 +9035,7 @@
           <a:p>
             <a:fld id="{9AB2E0C1-2107-4DA2-BB49-BDF54AED96B7}" type="datetime8">
               <a:rPr lang="en-US" smtClean="0"/>
-              <a:t>2/5/2018 9:39 AM</a:t>
+              <a:t>2/18/2019 4:42 PM</a:t>
             </a:fld>
             <a:endParaRPr lang="en-US" dirty="0"/>
           </a:p>
@@ -9228,7 +9224,7 @@
           <a:p>
             <a:fld id="{9AB2E0C1-2107-4DA2-BB49-BDF54AED96B7}" type="datetime8">
               <a:rPr lang="en-US" smtClean="0"/>
-              <a:t>2/5/2018 9:39 AM</a:t>
+              <a:t>2/18/2019 4:42 PM</a:t>
             </a:fld>
             <a:endParaRPr lang="en-US" dirty="0"/>
           </a:p>
@@ -21671,7 +21667,7 @@
                   <a:schemeClr val="bg1"/>
                 </a:solidFill>
               </a:rPr>
-              <a:t>SQL</a:t>
+              <a:t>PHP</a:t>
             </a:r>
             <a:br>
               <a:rPr lang="en-US" dirty="0">
@@ -21701,7 +21697,7 @@
         <p:spPr>
           <a:xfrm>
             <a:off x="274638" y="1221157"/>
-            <a:ext cx="11048999" cy="2252924"/>
+            <a:ext cx="11048999" cy="2876172"/>
           </a:xfrm>
         </p:spPr>
         <p:txBody>
@@ -21709,83 +21705,37 @@
           <a:lstStyle/>
           <a:p>
             <a:r>
-              <a:rPr lang="en-US" sz="3200" dirty="0"/>
-              <a:t>SELECT </a:t>
-            </a:r>
-            <a:r>
-              <a:rPr lang="en-US" sz="3200" dirty="0">
-                <a:solidFill>
-                  <a:srgbClr val="FF0000"/>
-                </a:solidFill>
-              </a:rPr>
-              <a:t>*</a:t>
-            </a:r>
-            <a:r>
-              <a:rPr lang="en-US" sz="3200" dirty="0"/>
-              <a:t> </a:t>
-            </a:r>
-          </a:p>
-          <a:p>
-            <a:r>
-              <a:rPr lang="en-US" sz="3200" dirty="0"/>
-              <a:t>	FROM </a:t>
-            </a:r>
-            <a:r>
-              <a:rPr lang="en-US" sz="3200" dirty="0">
-                <a:solidFill>
-                  <a:srgbClr val="0070C0"/>
-                </a:solidFill>
-              </a:rPr>
-              <a:t>Book</a:t>
-            </a:r>
-            <a:r>
-              <a:rPr lang="en-US" sz="3200" dirty="0"/>
-              <a:t> </a:t>
-            </a:r>
-          </a:p>
-          <a:p>
-            <a:r>
-              <a:rPr lang="en-US" sz="3200" dirty="0"/>
-              <a:t>	WHERE price </a:t>
-            </a:r>
-            <a:r>
-              <a:rPr lang="en-US" sz="3200" dirty="0">
-                <a:solidFill>
-                  <a:srgbClr val="00B050"/>
-                </a:solidFill>
-              </a:rPr>
-              <a:t>&gt; 100.00 </a:t>
-            </a:r>
-          </a:p>
-          <a:p>
-            <a:r>
-              <a:rPr lang="en-US" sz="3200" dirty="0"/>
-              <a:t>ORDER BY </a:t>
-            </a:r>
-            <a:r>
-              <a:rPr lang="en-US" sz="3200" dirty="0">
-                <a:solidFill>
-                  <a:srgbClr val="B4009E"/>
-                </a:solidFill>
-              </a:rPr>
-              <a:t>title</a:t>
-            </a:r>
-            <a:r>
-              <a:rPr lang="en-US" sz="3200" dirty="0"/>
-              <a:t>;</a:t>
-            </a:r>
-            <a:endParaRPr lang="en-US" sz="3200" b="1" dirty="0">
-              <a:solidFill>
-                <a:schemeClr val="bg1"/>
-              </a:solidFill>
-            </a:endParaRPr>
+              <a:rPr lang="en-US" dirty="0"/>
+              <a:t>&lt;?PHP</a:t>
+            </a:r>
+          </a:p>
+          <a:p>
+            <a:r>
+              <a:rPr lang="en-US" dirty="0"/>
+              <a:t>	</a:t>
+            </a:r>
+          </a:p>
+          <a:p>
+            <a:r>
+              <a:rPr lang="en-US" dirty="0"/>
+              <a:t>	echo “Hello Everyone”;</a:t>
+            </a:r>
+          </a:p>
+          <a:p>
+            <a:endParaRPr lang="en-US" dirty="0"/>
+          </a:p>
+          <a:p>
+            <a:r>
+              <a:rPr lang="en-US" dirty="0"/>
+              <a:t>?&gt;</a:t>
+            </a:r>
           </a:p>
         </p:txBody>
       </p:sp>
     </p:spTree>
     <p:extLst>
       <p:ext uri="{BB962C8B-B14F-4D97-AF65-F5344CB8AC3E}">
-        <p14:creationId xmlns:p14="http://schemas.microsoft.com/office/powerpoint/2010/main" val="3939829753"/>
+        <p14:creationId xmlns:p14="http://schemas.microsoft.com/office/powerpoint/2010/main" val="4048555091"/>
       </p:ext>
     </p:extLst>
   </p:cSld>
@@ -22183,7 +22133,7 @@
                   <a:schemeClr val="bg1"/>
                 </a:solidFill>
               </a:rPr>
-              <a:t>PHP</a:t>
+              <a:t>SQL</a:t>
             </a:r>
             <a:br>
               <a:rPr lang="en-US" dirty="0">
@@ -22213,7 +22163,7 @@
         <p:spPr>
           <a:xfrm>
             <a:off x="274638" y="1221157"/>
-            <a:ext cx="11048999" cy="2876172"/>
+            <a:ext cx="11048999" cy="2252924"/>
           </a:xfrm>
         </p:spPr>
         <p:txBody>
@@ -22221,37 +22171,83 @@
           <a:lstStyle/>
           <a:p>
             <a:r>
-              <a:rPr lang="en-US" dirty="0"/>
-              <a:t>&lt;?PHP</a:t>
-            </a:r>
-          </a:p>
-          <a:p>
-            <a:r>
-              <a:rPr lang="en-US" dirty="0"/>
-              <a:t>	</a:t>
-            </a:r>
-          </a:p>
-          <a:p>
-            <a:r>
-              <a:rPr lang="en-US" dirty="0"/>
-              <a:t>	echo “Hello Everyone”;</a:t>
-            </a:r>
-          </a:p>
-          <a:p>
-            <a:endParaRPr lang="en-US" dirty="0"/>
-          </a:p>
-          <a:p>
-            <a:r>
-              <a:rPr lang="en-US" dirty="0"/>
-              <a:t>?&gt;</a:t>
-            </a:r>
+              <a:rPr lang="en-US" sz="3200" dirty="0"/>
+              <a:t>SELECT </a:t>
+            </a:r>
+            <a:r>
+              <a:rPr lang="en-US" sz="3200" dirty="0">
+                <a:solidFill>
+                  <a:srgbClr val="FF0000"/>
+                </a:solidFill>
+              </a:rPr>
+              <a:t>*</a:t>
+            </a:r>
+            <a:r>
+              <a:rPr lang="en-US" sz="3200" dirty="0"/>
+              <a:t> </a:t>
+            </a:r>
+          </a:p>
+          <a:p>
+            <a:r>
+              <a:rPr lang="en-US" sz="3200" dirty="0"/>
+              <a:t>	FROM </a:t>
+            </a:r>
+            <a:r>
+              <a:rPr lang="en-US" sz="3200" dirty="0">
+                <a:solidFill>
+                  <a:srgbClr val="0070C0"/>
+                </a:solidFill>
+              </a:rPr>
+              <a:t>Book</a:t>
+            </a:r>
+            <a:r>
+              <a:rPr lang="en-US" sz="3200" dirty="0"/>
+              <a:t> </a:t>
+            </a:r>
+          </a:p>
+          <a:p>
+            <a:r>
+              <a:rPr lang="en-US" sz="3200" dirty="0"/>
+              <a:t>	WHERE price </a:t>
+            </a:r>
+            <a:r>
+              <a:rPr lang="en-US" sz="3200" dirty="0">
+                <a:solidFill>
+                  <a:srgbClr val="00B050"/>
+                </a:solidFill>
+              </a:rPr>
+              <a:t>&gt; 100.00 </a:t>
+            </a:r>
+          </a:p>
+          <a:p>
+            <a:r>
+              <a:rPr lang="en-US" sz="3200" dirty="0"/>
+              <a:t>ORDER BY </a:t>
+            </a:r>
+            <a:r>
+              <a:rPr lang="en-US" sz="3200" dirty="0">
+                <a:solidFill>
+                  <a:srgbClr val="B4009E"/>
+                </a:solidFill>
+              </a:rPr>
+              <a:t>title</a:t>
+            </a:r>
+            <a:r>
+              <a:rPr lang="en-US" sz="3200" dirty="0"/>
+              <a:t>;</a:t>
+            </a:r>
+            <a:endParaRPr lang="en-US" sz="3200" b="1" dirty="0">
+              <a:solidFill>
+                <a:schemeClr val="bg1"/>
+              </a:solidFill>
+            </a:endParaRPr>
           </a:p>
         </p:txBody>
       </p:sp>
     </p:spTree>
     <p:extLst>
       <p:ext uri="{BB962C8B-B14F-4D97-AF65-F5344CB8AC3E}">
-        <p14:creationId xmlns:p14="http://schemas.microsoft.com/office/powerpoint/2010/main" val="4048555091"/>
+        <p14:creationId xmlns:p14="http://schemas.microsoft.com/office/powerpoint/2010/main" val="3939829753"/>
       </p:ext>
     </p:extLst>
   </p:cSld>
@@ -31189,7 +31185,7 @@
           </a:lstStyle>
           <a:p>
             <a:r>
-              <a:rPr lang="en-US"/>
+              <a:rPr lang="en-US" dirty="0"/>
               <a:t>http://bit.ly/2nxB859</a:t>
             </a:r>
           </a:p>
@@ -35159,12 +35155,6 @@
 </file>
 
 <file path=customXml/item1.xml><?xml version="1.0" encoding="utf-8"?>
-<p:properties xmlns:p="http://schemas.microsoft.com/office/2006/metadata/properties" xmlns:xsi="http://www.w3.org/2001/XMLSchema-instance" xmlns:pc="http://schemas.microsoft.com/office/infopath/2007/PartnerControls">
-  <documentManagement/>
-</p:properties>
-</file>
-
-<file path=customXml/item2.xml><?xml version="1.0" encoding="utf-8"?>
 <?mso-contentType ?>
 <FormTemplates xmlns="http://schemas.microsoft.com/sharepoint/v3/contenttype/forms">
   <Display>DocumentLibraryForm</Display>
@@ -35173,7 +35163,7 @@
 </FormTemplates>
 </file>
 
-<file path=customXml/item3.xml><?xml version="1.0" encoding="utf-8"?>
+<file path=customXml/item2.xml><?xml version="1.0" encoding="utf-8"?>
 <ct:contentTypeSchema xmlns:ct="http://schemas.microsoft.com/office/2006/metadata/contentType" xmlns:ma="http://schemas.microsoft.com/office/2006/metadata/properties/metaAttributes" ct:_="" ma:_="" ma:contentTypeName="Document" ma:contentTypeID="0x010100A2B0BB5962AB3C45A9A1CE1EC4C4F647" ma:contentTypeVersion="3" ma:contentTypeDescription="Create a new document." ma:contentTypeScope="" ma:versionID="f0876370c90de824ab54c09b0bd2a056">
   <xsd:schema xmlns:xsd="http://www.w3.org/2001/XMLSchema" xmlns:xs="http://www.w3.org/2001/XMLSchema" xmlns:p="http://schemas.microsoft.com/office/2006/metadata/properties" xmlns:ns3="630a2e83-186a-4a0f-ab27-bee8a8096abc" targetNamespace="http://schemas.microsoft.com/office/2006/metadata/properties" ma:root="true" ma:fieldsID="a2a3b5ed8b4accd7c8a398d0cb075271" ns3:_="">
     <xsd:import namespace="630a2e83-186a-4a0f-ab27-bee8a8096abc"/>
@@ -35327,23 +35317,13 @@
 </ct:contentTypeSchema>
 </file>
 
-<file path=customXml/itemProps1.xml><?xml version="1.0" encoding="utf-8"?>
-<ds:datastoreItem xmlns:ds="http://schemas.openxmlformats.org/officeDocument/2006/customXml" ds:itemID="{F990F116-B58F-4255-B05B-DA3808E0E5C6}">
-  <ds:schemaRefs>
-    <ds:schemaRef ds:uri="http://purl.org/dc/terms/"/>
-    <ds:schemaRef ds:uri="http://schemas.openxmlformats.org/package/2006/metadata/core-properties"/>
-    <ds:schemaRef ds:uri="630a2e83-186a-4a0f-ab27-bee8a8096abc"/>
-    <ds:schemaRef ds:uri="http://purl.org/dc/dcmitype/"/>
-    <ds:schemaRef ds:uri="http://schemas.microsoft.com/office/infopath/2007/PartnerControls"/>
-    <ds:schemaRef ds:uri="http://purl.org/dc/elements/1.1/"/>
-    <ds:schemaRef ds:uri="http://schemas.microsoft.com/office/2006/documentManagement/types"/>
-    <ds:schemaRef ds:uri="http://schemas.microsoft.com/office/2006/metadata/properties"/>
-    <ds:schemaRef ds:uri="http://www.w3.org/XML/1998/namespace"/>
-  </ds:schemaRefs>
-</ds:datastoreItem>
+<file path=customXml/item3.xml><?xml version="1.0" encoding="utf-8"?>
+<p:properties xmlns:p="http://schemas.microsoft.com/office/2006/metadata/properties" xmlns:xsi="http://www.w3.org/2001/XMLSchema-instance" xmlns:pc="http://schemas.microsoft.com/office/infopath/2007/PartnerControls">
+  <documentManagement/>
+</p:properties>
 </file>
 
-<file path=customXml/itemProps2.xml><?xml version="1.0" encoding="utf-8"?>
+<file path=customXml/itemProps1.xml><?xml version="1.0" encoding="utf-8"?>
 <ds:datastoreItem xmlns:ds="http://schemas.openxmlformats.org/officeDocument/2006/customXml" ds:itemID="{758FDAC0-319D-4A54-8D8E-1D42CB1F8004}">
   <ds:schemaRefs>
     <ds:schemaRef ds:uri="http://schemas.microsoft.com/sharepoint/v3/contenttype/forms"/>
@@ -35351,7 +35331,7 @@
 </ds:datastoreItem>
 </file>
 
-<file path=customXml/itemProps3.xml><?xml version="1.0" encoding="utf-8"?>
+<file path=customXml/itemProps2.xml><?xml version="1.0" encoding="utf-8"?>
 <ds:datastoreItem xmlns:ds="http://schemas.openxmlformats.org/officeDocument/2006/customXml" ds:itemID="{A57F4CF9-F78A-44CC-A3DD-BB8B8C12128D}">
   <ds:schemaRefs>
     <ds:schemaRef ds:uri="http://schemas.microsoft.com/office/2006/metadata/contentType"/>
@@ -35367,4 +35347,20 @@
     <ds:schemaRef ds:uri="http://schemas.microsoft.com/internal/obd"/>
   </ds:schemaRefs>
 </ds:datastoreItem>
+</file>
+
+<file path=customXml/itemProps3.xml><?xml version="1.0" encoding="utf-8"?>
+<ds:datastoreItem xmlns:ds="http://schemas.openxmlformats.org/officeDocument/2006/customXml" ds:itemID="{F990F116-B58F-4255-B05B-DA3808E0E5C6}">
+  <ds:schemaRefs>
+    <ds:schemaRef ds:uri="http://purl.org/dc/terms/"/>
+    <ds:schemaRef ds:uri="http://schemas.openxmlformats.org/package/2006/metadata/core-properties"/>
+    <ds:schemaRef ds:uri="630a2e83-186a-4a0f-ab27-bee8a8096abc"/>
+    <ds:schemaRef ds:uri="http://purl.org/dc/dcmitype/"/>
+    <ds:schemaRef ds:uri="http://schemas.microsoft.com/office/infopath/2007/PartnerControls"/>
+    <ds:schemaRef ds:uri="http://purl.org/dc/elements/1.1/"/>
+    <ds:schemaRef ds:uri="http://schemas.microsoft.com/office/2006/documentManagement/types"/>
+    <ds:schemaRef ds:uri="http://schemas.microsoft.com/office/2006/metadata/properties"/>
+    <ds:schemaRef ds:uri="http://www.w3.org/XML/1998/namespace"/>
+  </ds:schemaRefs>
+</ds:datastoreItem>
 </file>
</xml_diff>